<commit_message>
Statistic library added and called
</commit_message>
<xml_diff>
--- a/escrita/resumos/SIA-2022/Modelo-Painel-SIA-UFV-2022.pptx
+++ b/escrita/resumos/SIA-2022/Modelo-Painel-SIA-UFV-2022.pptx
@@ -243,7 +243,7 @@
           <a:p>
             <a:fld id="{F874DBAF-D395-4A10-84EF-2839F74D3707}" type="datetimeFigureOut">
               <a:rPr lang="pt-BR" smtClean="0"/>
-              <a:t>04/08/2022</a:t>
+              <a:t>08/08/2022</a:t>
             </a:fld>
             <a:endParaRPr lang="pt-BR"/>
           </a:p>
@@ -413,7 +413,7 @@
           <a:p>
             <a:fld id="{F874DBAF-D395-4A10-84EF-2839F74D3707}" type="datetimeFigureOut">
               <a:rPr lang="pt-BR" smtClean="0"/>
-              <a:t>04/08/2022</a:t>
+              <a:t>08/08/2022</a:t>
             </a:fld>
             <a:endParaRPr lang="pt-BR"/>
           </a:p>
@@ -593,7 +593,7 @@
           <a:p>
             <a:fld id="{F874DBAF-D395-4A10-84EF-2839F74D3707}" type="datetimeFigureOut">
               <a:rPr lang="pt-BR" smtClean="0"/>
-              <a:t>04/08/2022</a:t>
+              <a:t>08/08/2022</a:t>
             </a:fld>
             <a:endParaRPr lang="pt-BR"/>
           </a:p>
@@ -763,7 +763,7 @@
           <a:p>
             <a:fld id="{F874DBAF-D395-4A10-84EF-2839F74D3707}" type="datetimeFigureOut">
               <a:rPr lang="pt-BR" smtClean="0"/>
-              <a:t>04/08/2022</a:t>
+              <a:t>08/08/2022</a:t>
             </a:fld>
             <a:endParaRPr lang="pt-BR"/>
           </a:p>
@@ -1007,7 +1007,7 @@
           <a:p>
             <a:fld id="{F874DBAF-D395-4A10-84EF-2839F74D3707}" type="datetimeFigureOut">
               <a:rPr lang="pt-BR" smtClean="0"/>
-              <a:t>04/08/2022</a:t>
+              <a:t>08/08/2022</a:t>
             </a:fld>
             <a:endParaRPr lang="pt-BR"/>
           </a:p>
@@ -1239,7 +1239,7 @@
           <a:p>
             <a:fld id="{F874DBAF-D395-4A10-84EF-2839F74D3707}" type="datetimeFigureOut">
               <a:rPr lang="pt-BR" smtClean="0"/>
-              <a:t>04/08/2022</a:t>
+              <a:t>08/08/2022</a:t>
             </a:fld>
             <a:endParaRPr lang="pt-BR"/>
           </a:p>
@@ -1606,7 +1606,7 @@
           <a:p>
             <a:fld id="{F874DBAF-D395-4A10-84EF-2839F74D3707}" type="datetimeFigureOut">
               <a:rPr lang="pt-BR" smtClean="0"/>
-              <a:t>04/08/2022</a:t>
+              <a:t>08/08/2022</a:t>
             </a:fld>
             <a:endParaRPr lang="pt-BR"/>
           </a:p>
@@ -1724,7 +1724,7 @@
           <a:p>
             <a:fld id="{F874DBAF-D395-4A10-84EF-2839F74D3707}" type="datetimeFigureOut">
               <a:rPr lang="pt-BR" smtClean="0"/>
-              <a:t>04/08/2022</a:t>
+              <a:t>08/08/2022</a:t>
             </a:fld>
             <a:endParaRPr lang="pt-BR"/>
           </a:p>
@@ -1819,7 +1819,7 @@
           <a:p>
             <a:fld id="{F874DBAF-D395-4A10-84EF-2839F74D3707}" type="datetimeFigureOut">
               <a:rPr lang="pt-BR" smtClean="0"/>
-              <a:t>04/08/2022</a:t>
+              <a:t>08/08/2022</a:t>
             </a:fld>
             <a:endParaRPr lang="pt-BR"/>
           </a:p>
@@ -2096,7 +2096,7 @@
           <a:p>
             <a:fld id="{F874DBAF-D395-4A10-84EF-2839F74D3707}" type="datetimeFigureOut">
               <a:rPr lang="pt-BR" smtClean="0"/>
-              <a:t>04/08/2022</a:t>
+              <a:t>08/08/2022</a:t>
             </a:fld>
             <a:endParaRPr lang="pt-BR"/>
           </a:p>
@@ -2353,7 +2353,7 @@
           <a:p>
             <a:fld id="{F874DBAF-D395-4A10-84EF-2839F74D3707}" type="datetimeFigureOut">
               <a:rPr lang="pt-BR" smtClean="0"/>
-              <a:t>04/08/2022</a:t>
+              <a:t>08/08/2022</a:t>
             </a:fld>
             <a:endParaRPr lang="pt-BR"/>
           </a:p>
@@ -2566,7 +2566,7 @@
           <a:p>
             <a:fld id="{F874DBAF-D395-4A10-84EF-2839F74D3707}" type="datetimeFigureOut">
               <a:rPr lang="pt-BR" smtClean="0"/>
-              <a:t>04/08/2022</a:t>
+              <a:t>08/08/2022</a:t>
             </a:fld>
             <a:endParaRPr lang="pt-BR"/>
           </a:p>
@@ -3173,8 +3173,8 @@
         </p:nvSpPr>
         <p:spPr>
           <a:xfrm>
-            <a:off x="3185652" y="15396492"/>
-            <a:ext cx="12447638" cy="646331"/>
+            <a:off x="3192412" y="12904436"/>
+            <a:ext cx="12447638" cy="5632311"/>
           </a:xfrm>
           <a:prstGeom prst="rect">
             <a:avLst/>
@@ -3188,17 +3188,15 @@
           <a:lstStyle/>
           <a:p>
             <a:r>
-              <a:rPr lang="pt-BR" sz="3600" dirty="0"/>
-              <a:t>Sugere-se letra minúscula, fonte </a:t>
-            </a:r>
-            <a:r>
-              <a:rPr lang="pt-BR" sz="3600" b="1" dirty="0" err="1"/>
-              <a:t>Calibri</a:t>
-            </a:r>
-            <a:r>
-              <a:rPr lang="pt-BR" sz="3600" dirty="0"/>
-              <a:t>, tamanho 36.</a:t>
-            </a:r>
+              <a:rPr lang="pt-BR" sz="3600" dirty="0">
+                <a:effectLst/>
+                <a:latin typeface="Calibri" panose="020F0502020204030204" pitchFamily="34" charset="0"/>
+                <a:ea typeface="Calibri" panose="020F0502020204030204" pitchFamily="34" charset="0"/>
+                <a:cs typeface="Times New Roman" panose="02020603050405020304" pitchFamily="18" charset="0"/>
+              </a:rPr>
+              <a:t>	Desastres ambientais, como o rompimento de barragens, causam impactos que vão muito além da área de ocorrência. Da região de origem até a sua chegada ao mar, os resíduos podem causam tanto impactos ambientais quanto econômicos. Do desastre da barragem de Fundão, em Mariana (MG), por exemplo, estima-se que as prefeituras das áreas envolvidas terão que gastar cerca de R$150 milhões para a recuperação das localidades. Além disso, o impacto ambiental é incalculável, uma vez que em contato com os rios, os rejeitos causam o desequilíbrio daquele ecossistema. </a:t>
+            </a:r>
+            <a:endParaRPr lang="pt-BR" sz="3600" dirty="0"/>
           </a:p>
         </p:txBody>
       </p:sp>
@@ -3216,8 +3214,8 @@
         </p:nvSpPr>
         <p:spPr>
           <a:xfrm>
-            <a:off x="16545386" y="15364109"/>
-            <a:ext cx="12447638" cy="646331"/>
+            <a:off x="16658073" y="12681676"/>
+            <a:ext cx="12447638" cy="5993949"/>
           </a:xfrm>
           <a:prstGeom prst="rect">
             <a:avLst/>
@@ -3230,17 +3228,67 @@
           </a:bodyPr>
           <a:lstStyle/>
           <a:p>
-            <a:r>
-              <a:rPr lang="pt-BR" sz="3600" dirty="0"/>
-              <a:t>Sugere-se letra minúscula, fonte </a:t>
-            </a:r>
-            <a:r>
-              <a:rPr lang="pt-BR" sz="3600" b="1" dirty="0" err="1"/>
-              <a:t>Calibri</a:t>
-            </a:r>
-            <a:r>
-              <a:rPr lang="pt-BR" sz="3600" dirty="0"/>
-              <a:t>, tamanho 36.</a:t>
+            <a:pPr indent="449580">
+              <a:lnSpc>
+                <a:spcPct val="107000"/>
+              </a:lnSpc>
+              <a:spcAft>
+                <a:spcPts val="800"/>
+              </a:spcAft>
+            </a:pPr>
+            <a:r>
+              <a:rPr lang="pt-BR" sz="3600" dirty="0">
+                <a:effectLst/>
+                <a:latin typeface="Calibri" panose="020F0502020204030204" pitchFamily="34" charset="0"/>
+                <a:ea typeface="Calibri" panose="020F0502020204030204" pitchFamily="34" charset="0"/>
+                <a:cs typeface="Times New Roman" panose="02020603050405020304" pitchFamily="18" charset="0"/>
+              </a:rPr>
+              <a:t>Utilizando técnicas adequadas, foi possível aplicar o Processo de Descoberta de Conhecimento em Bases de Dados (</a:t>
+            </a:r>
+            <a:r>
+              <a:rPr lang="pt-BR" sz="3600" i="1" dirty="0" err="1">
+                <a:effectLst/>
+                <a:latin typeface="Calibri" panose="020F0502020204030204" pitchFamily="34" charset="0"/>
+                <a:ea typeface="Calibri" panose="020F0502020204030204" pitchFamily="34" charset="0"/>
+                <a:cs typeface="Times New Roman" panose="02020603050405020304" pitchFamily="18" charset="0"/>
+              </a:rPr>
+              <a:t>Knowledge</a:t>
+            </a:r>
+            <a:r>
+              <a:rPr lang="pt-BR" sz="3600" i="1" dirty="0">
+                <a:effectLst/>
+                <a:latin typeface="Calibri" panose="020F0502020204030204" pitchFamily="34" charset="0"/>
+                <a:ea typeface="Calibri" panose="020F0502020204030204" pitchFamily="34" charset="0"/>
+                <a:cs typeface="Times New Roman" panose="02020603050405020304" pitchFamily="18" charset="0"/>
+              </a:rPr>
+              <a:t> Discovery in </a:t>
+            </a:r>
+            <a:r>
+              <a:rPr lang="pt-BR" sz="3600" i="1" dirty="0" err="1">
+                <a:effectLst/>
+                <a:latin typeface="Calibri" panose="020F0502020204030204" pitchFamily="34" charset="0"/>
+                <a:ea typeface="Calibri" panose="020F0502020204030204" pitchFamily="34" charset="0"/>
+                <a:cs typeface="Times New Roman" panose="02020603050405020304" pitchFamily="18" charset="0"/>
+              </a:rPr>
+              <a:t>Database</a:t>
+            </a:r>
+            <a:r>
+              <a:rPr lang="pt-BR" sz="3600" i="1" dirty="0">
+                <a:effectLst/>
+                <a:latin typeface="Calibri" panose="020F0502020204030204" pitchFamily="34" charset="0"/>
+                <a:ea typeface="Calibri" panose="020F0502020204030204" pitchFamily="34" charset="0"/>
+                <a:cs typeface="Times New Roman" panose="02020603050405020304" pitchFamily="18" charset="0"/>
+              </a:rPr>
+              <a:t> – KDD</a:t>
+            </a:r>
+            <a:r>
+              <a:rPr lang="pt-BR" sz="3600" dirty="0">
+                <a:effectLst/>
+                <a:latin typeface="Calibri" panose="020F0502020204030204" pitchFamily="34" charset="0"/>
+                <a:ea typeface="Calibri" panose="020F0502020204030204" pitchFamily="34" charset="0"/>
+                <a:cs typeface="Times New Roman" panose="02020603050405020304" pitchFamily="18" charset="0"/>
+              </a:rPr>
+              <a:t>) a fim de agrupar cidades próximas às bacias hidrográficas, possibilitando assim a geração desses grupos de cidades. Posteriormente, buscou-se utilizar outras estratégias para estudar cada um desses grupos formados, buscando assim identificar padrões existente naqueles dados. Com isso, estabeleceu-se uma metodologia que foi utilizada em uma base de dados formada com dados públicos e de distintas fontes, garantindo o caráter heterogêneo deles. </a:t>
             </a:r>
           </a:p>
         </p:txBody>
@@ -3260,7 +3308,7 @@
         <p:spPr>
           <a:xfrm>
             <a:off x="3185652" y="19791776"/>
-            <a:ext cx="12447638" cy="646331"/>
+            <a:ext cx="12447638" cy="2308324"/>
           </a:xfrm>
           <a:prstGeom prst="rect">
             <a:avLst/>
@@ -3274,17 +3322,15 @@
           <a:lstStyle/>
           <a:p>
             <a:r>
-              <a:rPr lang="pt-BR" sz="3600" dirty="0"/>
-              <a:t>Sugere-se letra minúscula, fonte </a:t>
-            </a:r>
-            <a:r>
-              <a:rPr lang="pt-BR" sz="3600" b="1" dirty="0" err="1"/>
-              <a:t>Calibri</a:t>
-            </a:r>
-            <a:r>
-              <a:rPr lang="pt-BR" sz="3600" dirty="0"/>
-              <a:t>, tamanho 36.</a:t>
-            </a:r>
+              <a:rPr lang="pt-BR" sz="3600" dirty="0">
+                <a:effectLst/>
+                <a:latin typeface="Calibri" panose="020F0502020204030204" pitchFamily="34" charset="0"/>
+                <a:ea typeface="Calibri" panose="020F0502020204030204" pitchFamily="34" charset="0"/>
+                <a:cs typeface="Times New Roman" panose="02020603050405020304" pitchFamily="18" charset="0"/>
+              </a:rPr>
+              <a:t>	Buscando formas de auxiliar na recuperação dessas áreas degradadas, é proposto o desenvolvimento de um arcabouço computacional para suportar a tomada de decisões de especialistas neste contexto</a:t>
+            </a:r>
+            <a:endParaRPr lang="pt-BR" sz="3600" dirty="0"/>
           </a:p>
         </p:txBody>
       </p:sp>
@@ -3302,8 +3348,8 @@
         </p:nvSpPr>
         <p:spPr>
           <a:xfrm>
-            <a:off x="16770760" y="19791776"/>
-            <a:ext cx="12447638" cy="646331"/>
+            <a:off x="16770760" y="19399520"/>
+            <a:ext cx="12447638" cy="5401159"/>
           </a:xfrm>
           <a:prstGeom prst="rect">
             <a:avLst/>
@@ -3316,17 +3362,40 @@
           </a:bodyPr>
           <a:lstStyle/>
           <a:p>
-            <a:r>
-              <a:rPr lang="pt-BR" sz="3600" dirty="0"/>
-              <a:t>Sugere-se letra minúscula, fonte </a:t>
-            </a:r>
-            <a:r>
-              <a:rPr lang="pt-BR" sz="3600" b="1" dirty="0" err="1"/>
-              <a:t>Calibri</a:t>
-            </a:r>
-            <a:r>
-              <a:rPr lang="pt-BR" sz="3600" dirty="0"/>
-              <a:t>, tamanho 36.</a:t>
+            <a:pPr indent="449580">
+              <a:lnSpc>
+                <a:spcPct val="107000"/>
+              </a:lnSpc>
+              <a:spcAft>
+                <a:spcPts val="800"/>
+              </a:spcAft>
+            </a:pPr>
+            <a:r>
+              <a:rPr lang="pt-BR" sz="3600" dirty="0">
+                <a:effectLst/>
+                <a:latin typeface="Calibri" panose="020F0502020204030204" pitchFamily="34" charset="0"/>
+                <a:ea typeface="Calibri" panose="020F0502020204030204" pitchFamily="34" charset="0"/>
+                <a:cs typeface="Times New Roman" panose="02020603050405020304" pitchFamily="18" charset="0"/>
+              </a:rPr>
+              <a:t>Dessa forma, implementou-se um SIG utilizando tecnologias </a:t>
+            </a:r>
+            <a:r>
+              <a:rPr lang="pt-BR" sz="3600" i="1" dirty="0" err="1">
+                <a:effectLst/>
+                <a:latin typeface="Calibri" panose="020F0502020204030204" pitchFamily="34" charset="0"/>
+                <a:ea typeface="Calibri" panose="020F0502020204030204" pitchFamily="34" charset="0"/>
+                <a:cs typeface="Times New Roman" panose="02020603050405020304" pitchFamily="18" charset="0"/>
+              </a:rPr>
+              <a:t>opensource</a:t>
+            </a:r>
+            <a:r>
+              <a:rPr lang="pt-BR" sz="3600" dirty="0">
+                <a:effectLst/>
+                <a:latin typeface="Calibri" panose="020F0502020204030204" pitchFamily="34" charset="0"/>
+                <a:ea typeface="Calibri" panose="020F0502020204030204" pitchFamily="34" charset="0"/>
+                <a:cs typeface="Times New Roman" panose="02020603050405020304" pitchFamily="18" charset="0"/>
+              </a:rPr>
+              <a:t>, evitando quaisquer formas de custos futuros e possibilitando a liberdade para personalizar a ferramenta conforme as necessidades de cada usuário. Como trabalhos futuros, planeja-se tornar o sistema dinâmico, interagindo assim com quaisquer dados de entrada do usuário, permitindo a seleção dos atributos para agrupamento conforme o grau de importância para o problema, além de tornar visível as principais informações de cada agrupamento.</a:t>
             </a:r>
           </a:p>
         </p:txBody>
@@ -3345,8 +3414,8 @@
         </p:nvSpPr>
         <p:spPr>
           <a:xfrm>
-            <a:off x="3185652" y="26241467"/>
-            <a:ext cx="12447638" cy="646331"/>
+            <a:off x="3192412" y="25902036"/>
+            <a:ext cx="12447638" cy="4215578"/>
           </a:xfrm>
           <a:prstGeom prst="rect">
             <a:avLst/>
@@ -3359,17 +3428,148 @@
           </a:bodyPr>
           <a:lstStyle/>
           <a:p>
-            <a:r>
-              <a:rPr lang="pt-BR" sz="3600" dirty="0"/>
-              <a:t>Sugere-se letra minúscula, fonte </a:t>
-            </a:r>
-            <a:r>
-              <a:rPr lang="pt-BR" sz="3600" b="1" dirty="0" err="1"/>
-              <a:t>Calibri</a:t>
-            </a:r>
-            <a:r>
-              <a:rPr lang="pt-BR" sz="3600" dirty="0"/>
-              <a:t>, tamanho 36.</a:t>
+            <a:pPr indent="449580">
+              <a:lnSpc>
+                <a:spcPct val="107000"/>
+              </a:lnSpc>
+              <a:spcAft>
+                <a:spcPts val="800"/>
+              </a:spcAft>
+            </a:pPr>
+            <a:r>
+              <a:rPr lang="pt-BR" sz="3600" dirty="0">
+                <a:effectLst/>
+                <a:latin typeface="Calibri" panose="020F0502020204030204" pitchFamily="34" charset="0"/>
+                <a:ea typeface="Calibri" panose="020F0502020204030204" pitchFamily="34" charset="0"/>
+                <a:cs typeface="Times New Roman" panose="02020603050405020304" pitchFamily="18" charset="0"/>
+              </a:rPr>
+              <a:t>O SIG proposto reflete a metodologia criada, sendo desenvolvido utilizando a linguagem de marcação </a:t>
+            </a:r>
+            <a:r>
+              <a:rPr lang="pt-BR" sz="3600" i="1" dirty="0" err="1">
+                <a:effectLst/>
+                <a:latin typeface="Calibri" panose="020F0502020204030204" pitchFamily="34" charset="0"/>
+                <a:ea typeface="Calibri" panose="020F0502020204030204" pitchFamily="34" charset="0"/>
+                <a:cs typeface="Times New Roman" panose="02020603050405020304" pitchFamily="18" charset="0"/>
+              </a:rPr>
+              <a:t>HyperText</a:t>
+            </a:r>
+            <a:r>
+              <a:rPr lang="pt-BR" sz="3600" i="1" dirty="0">
+                <a:effectLst/>
+                <a:latin typeface="Calibri" panose="020F0502020204030204" pitchFamily="34" charset="0"/>
+                <a:ea typeface="Calibri" panose="020F0502020204030204" pitchFamily="34" charset="0"/>
+                <a:cs typeface="Times New Roman" panose="02020603050405020304" pitchFamily="18" charset="0"/>
+              </a:rPr>
+              <a:t> Markup </a:t>
+            </a:r>
+            <a:r>
+              <a:rPr lang="pt-BR" sz="3600" i="1" dirty="0" err="1">
+                <a:effectLst/>
+                <a:latin typeface="Calibri" panose="020F0502020204030204" pitchFamily="34" charset="0"/>
+                <a:ea typeface="Calibri" panose="020F0502020204030204" pitchFamily="34" charset="0"/>
+                <a:cs typeface="Times New Roman" panose="02020603050405020304" pitchFamily="18" charset="0"/>
+              </a:rPr>
+              <a:t>Language</a:t>
+            </a:r>
+            <a:r>
+              <a:rPr lang="pt-BR" sz="3600" dirty="0">
+                <a:effectLst/>
+                <a:latin typeface="Calibri" panose="020F0502020204030204" pitchFamily="34" charset="0"/>
+                <a:ea typeface="Calibri" panose="020F0502020204030204" pitchFamily="34" charset="0"/>
+                <a:cs typeface="Times New Roman" panose="02020603050405020304" pitchFamily="18" charset="0"/>
+              </a:rPr>
+              <a:t> (HTML), a linguagem de estilo </a:t>
+            </a:r>
+            <a:r>
+              <a:rPr lang="pt-BR" sz="3600" i="1" dirty="0" err="1">
+                <a:effectLst/>
+                <a:latin typeface="Calibri" panose="020F0502020204030204" pitchFamily="34" charset="0"/>
+                <a:ea typeface="Calibri" panose="020F0502020204030204" pitchFamily="34" charset="0"/>
+                <a:cs typeface="Times New Roman" panose="02020603050405020304" pitchFamily="18" charset="0"/>
+              </a:rPr>
+              <a:t>Cascading</a:t>
+            </a:r>
+            <a:r>
+              <a:rPr lang="pt-BR" sz="3600" i="1" dirty="0">
+                <a:effectLst/>
+                <a:latin typeface="Calibri" panose="020F0502020204030204" pitchFamily="34" charset="0"/>
+                <a:ea typeface="Calibri" panose="020F0502020204030204" pitchFamily="34" charset="0"/>
+                <a:cs typeface="Times New Roman" panose="02020603050405020304" pitchFamily="18" charset="0"/>
+              </a:rPr>
+              <a:t> </a:t>
+            </a:r>
+            <a:r>
+              <a:rPr lang="pt-BR" sz="3600" i="1" dirty="0" err="1">
+                <a:effectLst/>
+                <a:latin typeface="Calibri" panose="020F0502020204030204" pitchFamily="34" charset="0"/>
+                <a:ea typeface="Calibri" panose="020F0502020204030204" pitchFamily="34" charset="0"/>
+                <a:cs typeface="Times New Roman" panose="02020603050405020304" pitchFamily="18" charset="0"/>
+              </a:rPr>
+              <a:t>Style</a:t>
+            </a:r>
+            <a:r>
+              <a:rPr lang="pt-BR" sz="3600" i="1" dirty="0">
+                <a:effectLst/>
+                <a:latin typeface="Calibri" panose="020F0502020204030204" pitchFamily="34" charset="0"/>
+                <a:ea typeface="Calibri" panose="020F0502020204030204" pitchFamily="34" charset="0"/>
+                <a:cs typeface="Times New Roman" panose="02020603050405020304" pitchFamily="18" charset="0"/>
+              </a:rPr>
+              <a:t> </a:t>
+            </a:r>
+            <a:r>
+              <a:rPr lang="pt-BR" sz="3600" i="1" dirty="0" err="1">
+                <a:effectLst/>
+                <a:latin typeface="Calibri" panose="020F0502020204030204" pitchFamily="34" charset="0"/>
+                <a:ea typeface="Calibri" panose="020F0502020204030204" pitchFamily="34" charset="0"/>
+                <a:cs typeface="Times New Roman" panose="02020603050405020304" pitchFamily="18" charset="0"/>
+              </a:rPr>
+              <a:t>Sheets</a:t>
+            </a:r>
+            <a:r>
+              <a:rPr lang="pt-BR" sz="3600" dirty="0">
+                <a:effectLst/>
+                <a:latin typeface="Calibri" panose="020F0502020204030204" pitchFamily="34" charset="0"/>
+                <a:ea typeface="Calibri" panose="020F0502020204030204" pitchFamily="34" charset="0"/>
+                <a:cs typeface="Times New Roman" panose="02020603050405020304" pitchFamily="18" charset="0"/>
+              </a:rPr>
+              <a:t> (CSS) e as linguagens de programação </a:t>
+            </a:r>
+            <a:r>
+              <a:rPr lang="pt-BR" sz="3600" dirty="0" err="1">
+                <a:effectLst/>
+                <a:latin typeface="Calibri" panose="020F0502020204030204" pitchFamily="34" charset="0"/>
+                <a:ea typeface="Calibri" panose="020F0502020204030204" pitchFamily="34" charset="0"/>
+                <a:cs typeface="Times New Roman" panose="02020603050405020304" pitchFamily="18" charset="0"/>
+              </a:rPr>
+              <a:t>JavaScript</a:t>
+            </a:r>
+            <a:r>
+              <a:rPr lang="pt-BR" sz="3600" dirty="0">
+                <a:effectLst/>
+                <a:latin typeface="Calibri" panose="020F0502020204030204" pitchFamily="34" charset="0"/>
+                <a:ea typeface="Calibri" panose="020F0502020204030204" pitchFamily="34" charset="0"/>
+                <a:cs typeface="Times New Roman" panose="02020603050405020304" pitchFamily="18" charset="0"/>
+              </a:rPr>
+              <a:t> e Python. Além das tecnologias citadas, destaca-se também o uso da biblioteca gráfica </a:t>
+            </a:r>
+            <a:r>
+              <a:rPr lang="pt-BR" sz="3600" i="1" dirty="0" err="1">
+                <a:effectLst/>
+                <a:latin typeface="Calibri" panose="020F0502020204030204" pitchFamily="34" charset="0"/>
+                <a:ea typeface="Calibri" panose="020F0502020204030204" pitchFamily="34" charset="0"/>
+                <a:cs typeface="Times New Roman" panose="02020603050405020304" pitchFamily="18" charset="0"/>
+              </a:rPr>
+              <a:t>Leaflet</a:t>
+            </a:r>
+            <a:r>
+              <a:rPr lang="pt-BR" sz="3600" dirty="0">
+                <a:effectLst/>
+                <a:latin typeface="Calibri" panose="020F0502020204030204" pitchFamily="34" charset="0"/>
+                <a:ea typeface="Calibri" panose="020F0502020204030204" pitchFamily="34" charset="0"/>
+                <a:cs typeface="Times New Roman" panose="02020603050405020304" pitchFamily="18" charset="0"/>
+              </a:rPr>
+              <a:t>, permitindo renderizar os resultados obtidos em um mapa. </a:t>
             </a:r>
           </a:p>
         </p:txBody>
@@ -3388,8 +3588,8 @@
         </p:nvSpPr>
         <p:spPr>
           <a:xfrm>
-            <a:off x="16770760" y="26241466"/>
-            <a:ext cx="12447638" cy="646331"/>
+            <a:off x="16658073" y="26137860"/>
+            <a:ext cx="12447638" cy="6740307"/>
           </a:xfrm>
           <a:prstGeom prst="rect">
             <a:avLst/>
@@ -3402,17 +3602,121 @@
           </a:bodyPr>
           <a:lstStyle/>
           <a:p>
+            <a:pPr algn="l"/>
+            <a:r>
+              <a:rPr lang="pt-BR" sz="3600" b="0" i="0" u="none" strike="noStrike" baseline="0" dirty="0"/>
+              <a:t>[Barbosa et al. 2015] Barbosa, F. A. R., Maia-Barbosa, P. M., Nascimento, A. M. A., </a:t>
+            </a:r>
+            <a:r>
+              <a:rPr lang="pt-BR" sz="3600" b="0" i="0" u="none" strike="noStrike" baseline="0" dirty="0" err="1"/>
+              <a:t>Rietzler</a:t>
+            </a:r>
+            <a:r>
+              <a:rPr lang="pt-BR" sz="3600" b="0" i="0" u="none" strike="noStrike" baseline="0" dirty="0"/>
+              <a:t>, A. C., Franco, M. W., Paes, T. A., Reis, M., Moura, K. A. F., Dias, M. F., de Paula Á vila, M., et al. (2015). O desastre de mariana e suas consequências sociais, econ</a:t>
+            </a:r>
             <a:r>
               <a:rPr lang="pt-BR" sz="3600" dirty="0"/>
-              <a:t>Sugere-se letra minúscula, fonte </a:t>
-            </a:r>
-            <a:r>
-              <a:rPr lang="pt-BR" sz="3600" b="1" dirty="0" err="1"/>
-              <a:t>Calibri</a:t>
+              <a:t>ô</a:t>
+            </a:r>
+            <a:r>
+              <a:rPr lang="pt-BR" sz="3600" b="0" i="0" u="none" strike="noStrike" baseline="0" dirty="0"/>
+              <a:t>micas, pol</a:t>
             </a:r>
             <a:r>
               <a:rPr lang="pt-BR" sz="3600" dirty="0"/>
-              <a:t>, tamanho 36.</a:t>
+              <a:t>í</a:t>
+            </a:r>
+            <a:r>
+              <a:rPr lang="pt-BR" sz="3600" b="0" i="0" u="none" strike="noStrike" baseline="0" dirty="0"/>
+              <a:t>ticas e ambientais: porque evoluir da abordagem de gest</a:t>
+            </a:r>
+            <a:r>
+              <a:rPr lang="pt-BR" sz="3600" dirty="0"/>
+              <a:t>ã</a:t>
+            </a:r>
+            <a:r>
+              <a:rPr lang="pt-BR" sz="3600" b="0" i="0" u="none" strike="noStrike" baseline="0" dirty="0"/>
+              <a:t>o dos recursos naturais para governança dos recursos naturais? Arquivos do Museu de Hist</a:t>
+            </a:r>
+            <a:r>
+              <a:rPr lang="pt-BR" sz="3600" dirty="0"/>
+              <a:t>ó</a:t>
+            </a:r>
+            <a:r>
+              <a:rPr lang="pt-BR" sz="3600" b="0" i="0" u="none" strike="noStrike" baseline="0" dirty="0"/>
+              <a:t>ria Natural e Jardim Bot</a:t>
+            </a:r>
+            <a:r>
+              <a:rPr lang="pt-BR" sz="3600" dirty="0"/>
+              <a:t>â</a:t>
+            </a:r>
+            <a:r>
+              <a:rPr lang="pt-BR" sz="3600" b="0" i="0" u="none" strike="noStrike" baseline="0" dirty="0"/>
+              <a:t>nico da UFMG, 24(1-2).</a:t>
+            </a:r>
+          </a:p>
+          <a:p>
+            <a:pPr algn="l"/>
+            <a:endParaRPr lang="pt-BR" sz="3600" b="0" i="0" u="none" strike="noStrike" baseline="0" dirty="0"/>
+          </a:p>
+          <a:p>
+            <a:pPr algn="l"/>
+            <a:r>
+              <a:rPr lang="pt-BR" sz="3600" b="0" i="0" u="none" strike="noStrike" baseline="0" dirty="0"/>
+              <a:t>[</a:t>
+            </a:r>
+            <a:r>
+              <a:rPr lang="pt-BR" sz="3600" b="0" i="0" u="none" strike="noStrike" baseline="0" dirty="0" err="1"/>
+              <a:t>Fayyad</a:t>
+            </a:r>
+            <a:r>
+              <a:rPr lang="pt-BR" sz="3600" b="0" i="0" u="none" strike="noStrike" baseline="0" dirty="0"/>
+              <a:t> et al. 1996] </a:t>
+            </a:r>
+            <a:r>
+              <a:rPr lang="pt-BR" sz="3600" b="0" i="0" u="none" strike="noStrike" baseline="0" dirty="0" err="1"/>
+              <a:t>Fayyad</a:t>
+            </a:r>
+            <a:r>
+              <a:rPr lang="pt-BR" sz="3600" b="0" i="0" u="none" strike="noStrike" baseline="0" dirty="0"/>
+              <a:t>, U., </a:t>
+            </a:r>
+            <a:r>
+              <a:rPr lang="pt-BR" sz="3600" b="0" i="0" u="none" strike="noStrike" baseline="0" dirty="0" err="1"/>
+              <a:t>Piatetsky</a:t>
+            </a:r>
+            <a:r>
+              <a:rPr lang="pt-BR" sz="3600" b="0" i="0" u="none" strike="noStrike" baseline="0" dirty="0"/>
+              <a:t>-Shapiro, G., </a:t>
+            </a:r>
+            <a:r>
+              <a:rPr lang="pt-BR" sz="3600" b="0" i="0" u="none" strike="noStrike" baseline="0" dirty="0" err="1"/>
+              <a:t>and</a:t>
+            </a:r>
+            <a:r>
+              <a:rPr lang="pt-BR" sz="3600" b="0" i="0" u="none" strike="noStrike" baseline="0" dirty="0"/>
+              <a:t> </a:t>
+            </a:r>
+            <a:r>
+              <a:rPr lang="pt-BR" sz="3600" b="0" i="0" u="none" strike="noStrike" baseline="0" dirty="0" err="1"/>
+              <a:t>Smyth</a:t>
+            </a:r>
+            <a:r>
+              <a:rPr lang="pt-BR" sz="3600" b="0" i="0" u="none" strike="noStrike" baseline="0" dirty="0"/>
+              <a:t>, P. (1996). </a:t>
+            </a:r>
+            <a:r>
+              <a:rPr lang="pt-BR" sz="3600" b="0" i="0" u="none" strike="noStrike" baseline="0" dirty="0" err="1"/>
+              <a:t>From</a:t>
+            </a:r>
+            <a:r>
+              <a:rPr lang="pt-BR" sz="3600" b="0" i="0" u="none" strike="noStrike" baseline="0" dirty="0"/>
+              <a:t> data </a:t>
+            </a:r>
+            <a:r>
+              <a:rPr lang="en-US" sz="3600" b="0" i="0" u="none" strike="noStrike" baseline="0" dirty="0"/>
+              <a:t>mining to knowledge discovery in databases. AI magazine, 17(3):37–37.</a:t>
             </a:r>
           </a:p>
         </p:txBody>
@@ -3431,7 +3735,7 @@
         </p:nvSpPr>
         <p:spPr>
           <a:xfrm>
-            <a:off x="16545386" y="30276884"/>
+            <a:off x="16658073" y="33783006"/>
             <a:ext cx="12673012" cy="769441"/>
           </a:xfrm>
           <a:prstGeom prst="rect">
@@ -3475,7 +3779,7 @@
         </p:nvSpPr>
         <p:spPr>
           <a:xfrm>
-            <a:off x="16770760" y="31349340"/>
+            <a:off x="16883447" y="34980357"/>
             <a:ext cx="12447638" cy="646331"/>
           </a:xfrm>
           <a:prstGeom prst="rect">

</xml_diff>